<commit_message>
added more details to slide
</commit_message>
<xml_diff>
--- a/resources/Travel_Insurance_Presentation.pptx
+++ b/resources/Travel_Insurance_Presentation.pptx
@@ -7,8 +7,9 @@
   <p:sldIdLst>
     <p:sldId id="256" r:id="rId2"/>
     <p:sldId id="257" r:id="rId3"/>
-    <p:sldId id="258" r:id="rId4"/>
-    <p:sldId id="259" r:id="rId5"/>
+    <p:sldId id="260" r:id="rId4"/>
+    <p:sldId id="258" r:id="rId5"/>
+    <p:sldId id="259" r:id="rId6"/>
   </p:sldIdLst>
   <p:sldSz cx="12192000" cy="6858000"/>
   <p:notesSz cx="6858000" cy="9144000"/>
@@ -107,6 +108,11 @@
       </a:defRPr>
     </a:lvl9pPr>
   </p:defaultTextStyle>
+  <p:extLst>
+    <p:ext uri="{EFAFB233-063F-42B5-8137-9DF3F51BA10A}">
+      <p15:sldGuideLst xmlns:p15="http://schemas.microsoft.com/office/powerpoint/2012/main"/>
+    </p:ext>
+  </p:extLst>
 </p:presentation>
 </file>
 
@@ -3499,6 +3505,14 @@
 <file path=ppt/slides/slide3.xml><?xml version="1.0" encoding="utf-8"?>
 <p:sld xmlns:a="http://schemas.openxmlformats.org/drawingml/2006/main" xmlns:r="http://schemas.openxmlformats.org/officeDocument/2006/relationships" xmlns:p="http://schemas.openxmlformats.org/presentationml/2006/main">
   <p:cSld>
+    <p:bg>
+      <p:bgPr>
+        <a:solidFill>
+          <a:schemeClr val="bg1"/>
+        </a:solidFill>
+        <a:effectLst/>
+      </p:bgPr>
+    </p:bg>
     <p:spTree>
       <p:nvGrpSpPr>
         <p:cNvPr id="1" name=""/>
@@ -3518,6 +3532,313 @@
           <p:cNvPr id="2" name="Title 1">
             <a:extLst>
               <a:ext uri="{FF2B5EF4-FFF2-40B4-BE49-F238E27FC236}">
+                <a16:creationId xmlns:a16="http://schemas.microsoft.com/office/drawing/2014/main" id="{C71E330A-6944-0E6D-AA4D-080630AC1792}"/>
+              </a:ext>
+            </a:extLst>
+          </p:cNvPr>
+          <p:cNvSpPr>
+            <a:spLocks noGrp="1"/>
+          </p:cNvSpPr>
+          <p:nvPr>
+            <p:ph type="title"/>
+          </p:nvPr>
+        </p:nvSpPr>
+        <p:spPr>
+          <a:xfrm>
+            <a:off x="648929" y="629266"/>
+            <a:ext cx="3505495" cy="1622321"/>
+          </a:xfrm>
+        </p:spPr>
+        <p:txBody>
+          <a:bodyPr>
+            <a:normAutofit/>
+          </a:bodyPr>
+          <a:lstStyle/>
+          <a:p>
+            <a:r>
+              <a:rPr lang="en-US" sz="4100" dirty="0"/>
+              <a:t>Main Target: The Big Earners</a:t>
+            </a:r>
+          </a:p>
+        </p:txBody>
+      </p:sp>
+      <p:sp>
+        <p:nvSpPr>
+          <p:cNvPr id="3" name="Content Placeholder 2">
+            <a:extLst>
+              <a:ext uri="{FF2B5EF4-FFF2-40B4-BE49-F238E27FC236}">
+                <a16:creationId xmlns:a16="http://schemas.microsoft.com/office/drawing/2014/main" id="{9FEC5A3D-0E3D-9599-A9F6-1C3236C42CC5}"/>
+              </a:ext>
+            </a:extLst>
+          </p:cNvPr>
+          <p:cNvSpPr>
+            <a:spLocks noGrp="1"/>
+          </p:cNvSpPr>
+          <p:nvPr>
+            <p:ph idx="1"/>
+          </p:nvPr>
+        </p:nvSpPr>
+        <p:spPr>
+          <a:xfrm>
+            <a:off x="648931" y="2438400"/>
+            <a:ext cx="3505494" cy="3785419"/>
+          </a:xfrm>
+        </p:spPr>
+        <p:txBody>
+          <a:bodyPr>
+            <a:normAutofit/>
+          </a:bodyPr>
+          <a:lstStyle/>
+          <a:p>
+            <a:r>
+              <a:rPr lang="en-US" sz="2000" dirty="0"/>
+              <a:t>Those who purchased travel insurance earned more than those who didn’t purchase.</a:t>
+            </a:r>
+          </a:p>
+          <a:p>
+            <a:pPr lvl="1"/>
+            <a:r>
+              <a:rPr lang="en-US" sz="2000" b="1" dirty="0"/>
+              <a:t>56% higher</a:t>
+            </a:r>
+            <a:r>
+              <a:rPr lang="en-US" sz="2000" dirty="0"/>
+              <a:t> for buyers</a:t>
+            </a:r>
+          </a:p>
+          <a:p>
+            <a:pPr lvl="1"/>
+            <a:r>
+              <a:rPr lang="en-US" sz="2000" dirty="0"/>
+              <a:t>Median income for buyers: 1,250,000</a:t>
+            </a:r>
+          </a:p>
+          <a:p>
+            <a:pPr lvl="1"/>
+            <a:r>
+              <a:rPr lang="en-US" sz="2000" dirty="0"/>
+              <a:t>Median income for non-buyers: 800,000</a:t>
+            </a:r>
+          </a:p>
+          <a:p>
+            <a:pPr lvl="1"/>
+            <a:endParaRPr lang="en-US" sz="2000" dirty="0"/>
+          </a:p>
+          <a:p>
+            <a:pPr lvl="1"/>
+            <a:endParaRPr lang="en-US" sz="2000" dirty="0"/>
+          </a:p>
+        </p:txBody>
+      </p:sp>
+      <p:sp>
+        <p:nvSpPr>
+          <p:cNvPr id="10" name="Rectangle 9">
+            <a:extLst>
+              <a:ext uri="{FF2B5EF4-FFF2-40B4-BE49-F238E27FC236}">
+                <a16:creationId xmlns:a16="http://schemas.microsoft.com/office/drawing/2014/main" id="{5E39A796-BE83-48B1-B33F-35C4A32AAB57}"/>
+              </a:ext>
+              <a:ext uri="{C183D7F6-B498-43B3-948B-1728B52AA6E4}">
+                <adec:decorative xmlns:adec="http://schemas.microsoft.com/office/drawing/2017/decorative" val="1"/>
+              </a:ext>
+            </a:extLst>
+          </p:cNvPr>
+          <p:cNvSpPr>
+            <a:spLocks noGrp="1" noRot="1" noChangeAspect="1" noMove="1" noResize="1" noEditPoints="1" noAdjustHandles="1" noChangeArrowheads="1" noChangeShapeType="1" noTextEdit="1"/>
+          </p:cNvSpPr>
+          <p:nvPr>
+            <p:extLst>
+              <p:ext uri="{386F3935-93C4-4BCD-93E2-E3B085C9AB24}">
+                <p16:designElem xmlns:p16="http://schemas.microsoft.com/office/powerpoint/2015/main" val="1"/>
+              </p:ext>
+            </p:extLst>
+          </p:nvPr>
+        </p:nvSpPr>
+        <p:spPr>
+          <a:xfrm>
+            <a:off x="4639056" y="0"/>
+            <a:ext cx="7552944" cy="6858000"/>
+          </a:xfrm>
+          <a:prstGeom prst="rect">
+            <a:avLst/>
+          </a:prstGeom>
+          <a:solidFill>
+            <a:srgbClr val="C8CACA"/>
+          </a:solidFill>
+          <a:ln>
+            <a:noFill/>
+          </a:ln>
+        </p:spPr>
+        <p:style>
+          <a:lnRef idx="2">
+            <a:schemeClr val="accent1">
+              <a:shade val="50000"/>
+            </a:schemeClr>
+          </a:lnRef>
+          <a:fillRef idx="1">
+            <a:schemeClr val="accent1"/>
+          </a:fillRef>
+          <a:effectRef idx="0">
+            <a:schemeClr val="accent1"/>
+          </a:effectRef>
+          <a:fontRef idx="minor">
+            <a:schemeClr val="lt1"/>
+          </a:fontRef>
+        </p:style>
+        <p:txBody>
+          <a:bodyPr rtlCol="0" anchor="ctr"/>
+          <a:lstStyle/>
+          <a:p>
+            <a:pPr algn="ctr"/>
+            <a:endParaRPr lang="en-US"/>
+          </a:p>
+        </p:txBody>
+      </p:sp>
+      <p:sp>
+        <p:nvSpPr>
+          <p:cNvPr id="12" name="Rounded Rectangle 9">
+            <a:extLst>
+              <a:ext uri="{FF2B5EF4-FFF2-40B4-BE49-F238E27FC236}">
+                <a16:creationId xmlns:a16="http://schemas.microsoft.com/office/drawing/2014/main" id="{72F84B47-E267-4194-8194-831DB7B5547F}"/>
+              </a:ext>
+              <a:ext uri="{C183D7F6-B498-43B3-948B-1728B52AA6E4}">
+                <adec:decorative xmlns:adec="http://schemas.microsoft.com/office/drawing/2017/decorative" val="1"/>
+              </a:ext>
+            </a:extLst>
+          </p:cNvPr>
+          <p:cNvSpPr>
+            <a:spLocks noGrp="1" noRot="1" noChangeAspect="1" noMove="1" noResize="1" noEditPoints="1" noAdjustHandles="1" noChangeArrowheads="1" noChangeShapeType="1" noTextEdit="1"/>
+          </p:cNvSpPr>
+          <p:nvPr>
+            <p:extLst>
+              <p:ext uri="{386F3935-93C4-4BCD-93E2-E3B085C9AB24}">
+                <p16:designElem xmlns:p16="http://schemas.microsoft.com/office/powerpoint/2015/main" val="1"/>
+              </p:ext>
+            </p:extLst>
+          </p:nvPr>
+        </p:nvSpPr>
+        <p:spPr>
+          <a:xfrm>
+            <a:off x="5123688" y="557784"/>
+            <a:ext cx="6584098" cy="5739187"/>
+          </a:xfrm>
+          <a:prstGeom prst="roundRect">
+            <a:avLst>
+              <a:gd name="adj" fmla="val 0"/>
+            </a:avLst>
+          </a:prstGeom>
+          <a:solidFill>
+            <a:srgbClr val="FFFFFF"/>
+          </a:solidFill>
+          <a:ln w="9525">
+            <a:solidFill>
+              <a:srgbClr val="C8CACA"/>
+            </a:solidFill>
+          </a:ln>
+          <a:effectLst>
+            <a:outerShdw blurRad="57150" dist="19050" dir="5400000" algn="t" rotWithShape="0">
+              <a:prstClr val="black">
+                <a:alpha val="63000"/>
+              </a:prstClr>
+            </a:outerShdw>
+          </a:effectLst>
+        </p:spPr>
+        <p:style>
+          <a:lnRef idx="2">
+            <a:schemeClr val="accent1">
+              <a:shade val="50000"/>
+            </a:schemeClr>
+          </a:lnRef>
+          <a:fillRef idx="1">
+            <a:schemeClr val="accent1"/>
+          </a:fillRef>
+          <a:effectRef idx="0">
+            <a:schemeClr val="accent1"/>
+          </a:effectRef>
+          <a:fontRef idx="minor">
+            <a:schemeClr val="lt1"/>
+          </a:fontRef>
+        </p:style>
+        <p:txBody>
+          <a:bodyPr rtlCol="0" anchor="ctr"/>
+          <a:lstStyle/>
+          <a:p>
+            <a:pPr algn="ctr"/>
+            <a:endParaRPr lang="en-US"/>
+          </a:p>
+        </p:txBody>
+      </p:sp>
+      <p:pic>
+        <p:nvPicPr>
+          <p:cNvPr id="5" name="Picture 4" descr="Chart, box and whisker chart&#10;&#10;Description automatically generated">
+            <a:extLst>
+              <a:ext uri="{FF2B5EF4-FFF2-40B4-BE49-F238E27FC236}">
+                <a16:creationId xmlns:a16="http://schemas.microsoft.com/office/drawing/2014/main" id="{4EA434D3-EB49-3DEB-2E78-5573B6636DE7}"/>
+              </a:ext>
+            </a:extLst>
+          </p:cNvPr>
+          <p:cNvPicPr>
+            <a:picLocks noChangeAspect="1"/>
+          </p:cNvPicPr>
+          <p:nvPr/>
+        </p:nvPicPr>
+        <p:blipFill>
+          <a:blip r:embed="rId2">
+            <a:extLst>
+              <a:ext uri="{28A0092B-C50C-407E-A947-70E740481C1C}">
+                <a14:useLocalDpi xmlns:a14="http://schemas.microsoft.com/office/drawing/2010/main" val="0"/>
+              </a:ext>
+            </a:extLst>
+          </a:blip>
+          <a:stretch>
+            <a:fillRect/>
+          </a:stretch>
+        </p:blipFill>
+        <p:spPr>
+          <a:xfrm>
+            <a:off x="5405862" y="1522710"/>
+            <a:ext cx="6019331" cy="3809334"/>
+          </a:xfrm>
+          <a:prstGeom prst="rect">
+            <a:avLst/>
+          </a:prstGeom>
+          <a:effectLst/>
+        </p:spPr>
+      </p:pic>
+    </p:spTree>
+    <p:extLst>
+      <p:ext uri="{BB962C8B-B14F-4D97-AF65-F5344CB8AC3E}">
+        <p14:creationId xmlns:p14="http://schemas.microsoft.com/office/powerpoint/2010/main" val="266492458"/>
+      </p:ext>
+    </p:extLst>
+  </p:cSld>
+  <p:clrMapOvr>
+    <a:masterClrMapping/>
+  </p:clrMapOvr>
+</p:sld>
+</file>
+
+<file path=ppt/slides/slide4.xml><?xml version="1.0" encoding="utf-8"?>
+<p:sld xmlns:a="http://schemas.openxmlformats.org/drawingml/2006/main" xmlns:r="http://schemas.openxmlformats.org/officeDocument/2006/relationships" xmlns:p="http://schemas.openxmlformats.org/presentationml/2006/main">
+  <p:cSld>
+    <p:spTree>
+      <p:nvGrpSpPr>
+        <p:cNvPr id="1" name=""/>
+        <p:cNvGrpSpPr/>
+        <p:nvPr/>
+      </p:nvGrpSpPr>
+      <p:grpSpPr>
+        <a:xfrm>
+          <a:off x="0" y="0"/>
+          <a:ext cx="0" cy="0"/>
+          <a:chOff x="0" y="0"/>
+          <a:chExt cx="0" cy="0"/>
+        </a:xfrm>
+      </p:grpSpPr>
+      <p:sp>
+        <p:nvSpPr>
+          <p:cNvPr id="2" name="Title 1">
+            <a:extLst>
+              <a:ext uri="{FF2B5EF4-FFF2-40B4-BE49-F238E27FC236}">
                 <a16:creationId xmlns:a16="http://schemas.microsoft.com/office/drawing/2014/main" id="{7602E867-DC5D-BD6E-D304-E561A74D1D2E}"/>
               </a:ext>
             </a:extLst>
@@ -3614,7 +3935,7 @@
 </p:sld>
 </file>
 
-<file path=ppt/slides/slide4.xml><?xml version="1.0" encoding="utf-8"?>
+<file path=ppt/slides/slide5.xml><?xml version="1.0" encoding="utf-8"?>
 <p:sld xmlns:a="http://schemas.openxmlformats.org/drawingml/2006/main" xmlns:r="http://schemas.openxmlformats.org/officeDocument/2006/relationships" xmlns:p="http://schemas.openxmlformats.org/presentationml/2006/main">
   <p:cSld>
     <p:spTree>

</xml_diff>

<commit_message>
added additional images to slides
</commit_message>
<xml_diff>
--- a/resources/Travel_Insurance_Presentation.pptx
+++ b/resources/Travel_Insurance_Presentation.pptx
@@ -8,8 +8,11 @@
     <p:sldId id="256" r:id="rId2"/>
     <p:sldId id="257" r:id="rId3"/>
     <p:sldId id="260" r:id="rId4"/>
-    <p:sldId id="258" r:id="rId5"/>
-    <p:sldId id="259" r:id="rId6"/>
+    <p:sldId id="261" r:id="rId5"/>
+    <p:sldId id="263" r:id="rId6"/>
+    <p:sldId id="262" r:id="rId7"/>
+    <p:sldId id="258" r:id="rId8"/>
+    <p:sldId id="259" r:id="rId9"/>
   </p:sldIdLst>
   <p:sldSz cx="12192000" cy="6858000"/>
   <p:notesSz cx="6858000" cy="9144000"/>
@@ -116,6 +119,279 @@
 </p:presentation>
 </file>
 
+<file path=ppt/changesInfos/changesInfo1.xml><?xml version="1.0" encoding="utf-8"?>
+<pc:chgInfo xmlns:a="http://schemas.openxmlformats.org/drawingml/2006/main" xmlns:r="http://schemas.openxmlformats.org/officeDocument/2006/relationships" xmlns:ac="http://schemas.microsoft.com/office/drawing/2013/main/command" xmlns:pc="http://schemas.microsoft.com/office/powerpoint/2013/main/command">
+  <pc:docChgLst>
+    <pc:chgData name="Teruki Ito" userId="34785c0b-864e-41e6-9d6b-0f4b4aaf3c87" providerId="ADAL" clId="{6A8B257D-CF4F-4CFC-AE71-5629F4670AB1}"/>
+    <pc:docChg chg="custSel addSld modSld sldOrd">
+      <pc:chgData name="Teruki Ito" userId="34785c0b-864e-41e6-9d6b-0f4b4aaf3c87" providerId="ADAL" clId="{6A8B257D-CF4F-4CFC-AE71-5629F4670AB1}" dt="2022-08-09T23:20:06.355" v="933" actId="6549"/>
+      <pc:docMkLst>
+        <pc:docMk/>
+      </pc:docMkLst>
+      <pc:sldChg chg="modSp mod">
+        <pc:chgData name="Teruki Ito" userId="34785c0b-864e-41e6-9d6b-0f4b4aaf3c87" providerId="ADAL" clId="{6A8B257D-CF4F-4CFC-AE71-5629F4670AB1}" dt="2022-08-09T23:20:06.355" v="933" actId="6549"/>
+        <pc:sldMkLst>
+          <pc:docMk/>
+          <pc:sldMk cId="3618604705" sldId="258"/>
+        </pc:sldMkLst>
+        <pc:spChg chg="mod">
+          <ac:chgData name="Teruki Ito" userId="34785c0b-864e-41e6-9d6b-0f4b4aaf3c87" providerId="ADAL" clId="{6A8B257D-CF4F-4CFC-AE71-5629F4670AB1}" dt="2022-08-09T23:20:06.355" v="933" actId="6549"/>
+          <ac:spMkLst>
+            <pc:docMk/>
+            <pc:sldMk cId="3618604705" sldId="258"/>
+            <ac:spMk id="3" creationId="{36067ACF-7935-6E22-E6D2-4C9F1864F7EB}"/>
+          </ac:spMkLst>
+        </pc:spChg>
+      </pc:sldChg>
+      <pc:sldChg chg="addSp delSp modSp mod">
+        <pc:chgData name="Teruki Ito" userId="34785c0b-864e-41e6-9d6b-0f4b4aaf3c87" providerId="ADAL" clId="{6A8B257D-CF4F-4CFC-AE71-5629F4670AB1}" dt="2022-08-09T22:52:40.801" v="438" actId="113"/>
+        <pc:sldMkLst>
+          <pc:docMk/>
+          <pc:sldMk cId="266492458" sldId="260"/>
+        </pc:sldMkLst>
+        <pc:spChg chg="mod">
+          <ac:chgData name="Teruki Ito" userId="34785c0b-864e-41e6-9d6b-0f4b4aaf3c87" providerId="ADAL" clId="{6A8B257D-CF4F-4CFC-AE71-5629F4670AB1}" dt="2022-08-09T22:52:40.801" v="438" actId="113"/>
+          <ac:spMkLst>
+            <pc:docMk/>
+            <pc:sldMk cId="266492458" sldId="260"/>
+            <ac:spMk id="2" creationId="{C71E330A-6944-0E6D-AA4D-080630AC1792}"/>
+          </ac:spMkLst>
+        </pc:spChg>
+        <pc:spChg chg="mod">
+          <ac:chgData name="Teruki Ito" userId="34785c0b-864e-41e6-9d6b-0f4b4aaf3c87" providerId="ADAL" clId="{6A8B257D-CF4F-4CFC-AE71-5629F4670AB1}" dt="2022-08-09T22:52:32.309" v="437" actId="26606"/>
+          <ac:spMkLst>
+            <pc:docMk/>
+            <pc:sldMk cId="266492458" sldId="260"/>
+            <ac:spMk id="3" creationId="{9FEC5A3D-0E3D-9599-A9F6-1C3236C42CC5}"/>
+          </ac:spMkLst>
+        </pc:spChg>
+        <pc:spChg chg="del">
+          <ac:chgData name="Teruki Ito" userId="34785c0b-864e-41e6-9d6b-0f4b4aaf3c87" providerId="ADAL" clId="{6A8B257D-CF4F-4CFC-AE71-5629F4670AB1}" dt="2022-08-09T22:51:57.695" v="435" actId="26606"/>
+          <ac:spMkLst>
+            <pc:docMk/>
+            <pc:sldMk cId="266492458" sldId="260"/>
+            <ac:spMk id="10" creationId="{5E39A796-BE83-48B1-B33F-35C4A32AAB57}"/>
+          </ac:spMkLst>
+        </pc:spChg>
+        <pc:spChg chg="del">
+          <ac:chgData name="Teruki Ito" userId="34785c0b-864e-41e6-9d6b-0f4b4aaf3c87" providerId="ADAL" clId="{6A8B257D-CF4F-4CFC-AE71-5629F4670AB1}" dt="2022-08-09T22:51:57.695" v="435" actId="26606"/>
+          <ac:spMkLst>
+            <pc:docMk/>
+            <pc:sldMk cId="266492458" sldId="260"/>
+            <ac:spMk id="12" creationId="{72F84B47-E267-4194-8194-831DB7B5547F}"/>
+          </ac:spMkLst>
+        </pc:spChg>
+        <pc:spChg chg="add del">
+          <ac:chgData name="Teruki Ito" userId="34785c0b-864e-41e6-9d6b-0f4b4aaf3c87" providerId="ADAL" clId="{6A8B257D-CF4F-4CFC-AE71-5629F4670AB1}" dt="2022-08-09T22:52:32.309" v="437" actId="26606"/>
+          <ac:spMkLst>
+            <pc:docMk/>
+            <pc:sldMk cId="266492458" sldId="260"/>
+            <ac:spMk id="17" creationId="{B5FA7C47-B7C1-4D2E-AB49-ED23BA34BA83}"/>
+          </ac:spMkLst>
+        </pc:spChg>
+        <pc:spChg chg="add del">
+          <ac:chgData name="Teruki Ito" userId="34785c0b-864e-41e6-9d6b-0f4b4aaf3c87" providerId="ADAL" clId="{6A8B257D-CF4F-4CFC-AE71-5629F4670AB1}" dt="2022-08-09T22:52:32.309" v="437" actId="26606"/>
+          <ac:spMkLst>
+            <pc:docMk/>
+            <pc:sldMk cId="266492458" sldId="260"/>
+            <ac:spMk id="19" creationId="{596EE156-ABF1-4329-A6BA-03B4254E0877}"/>
+          </ac:spMkLst>
+        </pc:spChg>
+        <pc:spChg chg="add del">
+          <ac:chgData name="Teruki Ito" userId="34785c0b-864e-41e6-9d6b-0f4b4aaf3c87" providerId="ADAL" clId="{6A8B257D-CF4F-4CFC-AE71-5629F4670AB1}" dt="2022-08-09T22:52:32.309" v="437" actId="26606"/>
+          <ac:spMkLst>
+            <pc:docMk/>
+            <pc:sldMk cId="266492458" sldId="260"/>
+            <ac:spMk id="21" creationId="{19B9933F-AAB3-444A-8BB5-9CA194A8BC63}"/>
+          </ac:spMkLst>
+        </pc:spChg>
+        <pc:spChg chg="add del">
+          <ac:chgData name="Teruki Ito" userId="34785c0b-864e-41e6-9d6b-0f4b4aaf3c87" providerId="ADAL" clId="{6A8B257D-CF4F-4CFC-AE71-5629F4670AB1}" dt="2022-08-09T22:52:32.309" v="437" actId="26606"/>
+          <ac:spMkLst>
+            <pc:docMk/>
+            <pc:sldMk cId="266492458" sldId="260"/>
+            <ac:spMk id="23" creationId="{7D20183A-0B1D-4A1F-89B1-ADBEDBC6E54E}"/>
+          </ac:spMkLst>
+        </pc:spChg>
+        <pc:spChg chg="add del">
+          <ac:chgData name="Teruki Ito" userId="34785c0b-864e-41e6-9d6b-0f4b4aaf3c87" providerId="ADAL" clId="{6A8B257D-CF4F-4CFC-AE71-5629F4670AB1}" dt="2022-08-09T22:52:32.309" v="437" actId="26606"/>
+          <ac:spMkLst>
+            <pc:docMk/>
+            <pc:sldMk cId="266492458" sldId="260"/>
+            <ac:spMk id="25" creationId="{131031D3-26CD-4214-A9A4-5857EFA15A0C}"/>
+          </ac:spMkLst>
+        </pc:spChg>
+        <pc:spChg chg="add">
+          <ac:chgData name="Teruki Ito" userId="34785c0b-864e-41e6-9d6b-0f4b4aaf3c87" providerId="ADAL" clId="{6A8B257D-CF4F-4CFC-AE71-5629F4670AB1}" dt="2022-08-09T22:52:32.309" v="437" actId="26606"/>
+          <ac:spMkLst>
+            <pc:docMk/>
+            <pc:sldMk cId="266492458" sldId="260"/>
+            <ac:spMk id="30" creationId="{5E39A796-BE83-48B1-B33F-35C4A32AAB57}"/>
+          </ac:spMkLst>
+        </pc:spChg>
+        <pc:spChg chg="add">
+          <ac:chgData name="Teruki Ito" userId="34785c0b-864e-41e6-9d6b-0f4b4aaf3c87" providerId="ADAL" clId="{6A8B257D-CF4F-4CFC-AE71-5629F4670AB1}" dt="2022-08-09T22:52:32.309" v="437" actId="26606"/>
+          <ac:spMkLst>
+            <pc:docMk/>
+            <pc:sldMk cId="266492458" sldId="260"/>
+            <ac:spMk id="32" creationId="{72F84B47-E267-4194-8194-831DB7B5547F}"/>
+          </ac:spMkLst>
+        </pc:spChg>
+        <pc:picChg chg="mod">
+          <ac:chgData name="Teruki Ito" userId="34785c0b-864e-41e6-9d6b-0f4b4aaf3c87" providerId="ADAL" clId="{6A8B257D-CF4F-4CFC-AE71-5629F4670AB1}" dt="2022-08-09T22:52:32.309" v="437" actId="26606"/>
+          <ac:picMkLst>
+            <pc:docMk/>
+            <pc:sldMk cId="266492458" sldId="260"/>
+            <ac:picMk id="5" creationId="{4EA434D3-EB49-3DEB-2E78-5573B6636DE7}"/>
+          </ac:picMkLst>
+        </pc:picChg>
+      </pc:sldChg>
+      <pc:sldChg chg="addSp modSp new mod setBg">
+        <pc:chgData name="Teruki Ito" userId="34785c0b-864e-41e6-9d6b-0f4b4aaf3c87" providerId="ADAL" clId="{6A8B257D-CF4F-4CFC-AE71-5629F4670AB1}" dt="2022-08-09T23:17:55.308" v="932" actId="14100"/>
+        <pc:sldMkLst>
+          <pc:docMk/>
+          <pc:sldMk cId="2812457247" sldId="261"/>
+        </pc:sldMkLst>
+        <pc:spChg chg="mod">
+          <ac:chgData name="Teruki Ito" userId="34785c0b-864e-41e6-9d6b-0f4b4aaf3c87" providerId="ADAL" clId="{6A8B257D-CF4F-4CFC-AE71-5629F4670AB1}" dt="2022-08-09T22:52:45.736" v="439" actId="113"/>
+          <ac:spMkLst>
+            <pc:docMk/>
+            <pc:sldMk cId="2812457247" sldId="261"/>
+            <ac:spMk id="2" creationId="{DD7866C6-4E1F-F961-07D0-A71DCE6C6F4C}"/>
+          </ac:spMkLst>
+        </pc:spChg>
+        <pc:spChg chg="mod">
+          <ac:chgData name="Teruki Ito" userId="34785c0b-864e-41e6-9d6b-0f4b4aaf3c87" providerId="ADAL" clId="{6A8B257D-CF4F-4CFC-AE71-5629F4670AB1}" dt="2022-08-09T23:17:55.308" v="932" actId="14100"/>
+          <ac:spMkLst>
+            <pc:docMk/>
+            <pc:sldMk cId="2812457247" sldId="261"/>
+            <ac:spMk id="3" creationId="{0CA8BF37-DDAA-859C-308F-C3E399579D7C}"/>
+          </ac:spMkLst>
+        </pc:spChg>
+        <pc:spChg chg="add">
+          <ac:chgData name="Teruki Ito" userId="34785c0b-864e-41e6-9d6b-0f4b4aaf3c87" providerId="ADAL" clId="{6A8B257D-CF4F-4CFC-AE71-5629F4670AB1}" dt="2022-08-09T22:49:22.501" v="229" actId="26606"/>
+          <ac:spMkLst>
+            <pc:docMk/>
+            <pc:sldMk cId="2812457247" sldId="261"/>
+            <ac:spMk id="10" creationId="{5E39A796-BE83-48B1-B33F-35C4A32AAB57}"/>
+          </ac:spMkLst>
+        </pc:spChg>
+        <pc:spChg chg="add">
+          <ac:chgData name="Teruki Ito" userId="34785c0b-864e-41e6-9d6b-0f4b4aaf3c87" providerId="ADAL" clId="{6A8B257D-CF4F-4CFC-AE71-5629F4670AB1}" dt="2022-08-09T22:49:22.501" v="229" actId="26606"/>
+          <ac:spMkLst>
+            <pc:docMk/>
+            <pc:sldMk cId="2812457247" sldId="261"/>
+            <ac:spMk id="12" creationId="{72F84B47-E267-4194-8194-831DB7B5547F}"/>
+          </ac:spMkLst>
+        </pc:spChg>
+        <pc:picChg chg="add mod">
+          <ac:chgData name="Teruki Ito" userId="34785c0b-864e-41e6-9d6b-0f4b4aaf3c87" providerId="ADAL" clId="{6A8B257D-CF4F-4CFC-AE71-5629F4670AB1}" dt="2022-08-09T22:49:22.501" v="229" actId="26606"/>
+          <ac:picMkLst>
+            <pc:docMk/>
+            <pc:sldMk cId="2812457247" sldId="261"/>
+            <ac:picMk id="5" creationId="{3D8C7981-C153-CE9A-8178-1935D3D1298B}"/>
+          </ac:picMkLst>
+        </pc:picChg>
+      </pc:sldChg>
+      <pc:sldChg chg="addSp modSp new mod setBg">
+        <pc:chgData name="Teruki Ito" userId="34785c0b-864e-41e6-9d6b-0f4b4aaf3c87" providerId="ADAL" clId="{6A8B257D-CF4F-4CFC-AE71-5629F4670AB1}" dt="2022-08-09T23:17:33.615" v="927" actId="108"/>
+        <pc:sldMkLst>
+          <pc:docMk/>
+          <pc:sldMk cId="2079537592" sldId="262"/>
+        </pc:sldMkLst>
+        <pc:spChg chg="mod">
+          <ac:chgData name="Teruki Ito" userId="34785c0b-864e-41e6-9d6b-0f4b4aaf3c87" providerId="ADAL" clId="{6A8B257D-CF4F-4CFC-AE71-5629F4670AB1}" dt="2022-08-09T23:15:42.067" v="786" actId="26606"/>
+          <ac:spMkLst>
+            <pc:docMk/>
+            <pc:sldMk cId="2079537592" sldId="262"/>
+            <ac:spMk id="2" creationId="{0A0DAE92-6C2C-AE9B-5903-A965DA9E260E}"/>
+          </ac:spMkLst>
+        </pc:spChg>
+        <pc:spChg chg="mod">
+          <ac:chgData name="Teruki Ito" userId="34785c0b-864e-41e6-9d6b-0f4b4aaf3c87" providerId="ADAL" clId="{6A8B257D-CF4F-4CFC-AE71-5629F4670AB1}" dt="2022-08-09T23:17:33.615" v="927" actId="108"/>
+          <ac:spMkLst>
+            <pc:docMk/>
+            <pc:sldMk cId="2079537592" sldId="262"/>
+            <ac:spMk id="3" creationId="{0A0B7B8E-9911-7031-B9F6-E0A3F618EDCB}"/>
+          </ac:spMkLst>
+        </pc:spChg>
+        <pc:spChg chg="add">
+          <ac:chgData name="Teruki Ito" userId="34785c0b-864e-41e6-9d6b-0f4b4aaf3c87" providerId="ADAL" clId="{6A8B257D-CF4F-4CFC-AE71-5629F4670AB1}" dt="2022-08-09T23:15:42.067" v="786" actId="26606"/>
+          <ac:spMkLst>
+            <pc:docMk/>
+            <pc:sldMk cId="2079537592" sldId="262"/>
+            <ac:spMk id="10" creationId="{5E39A796-BE83-48B1-B33F-35C4A32AAB57}"/>
+          </ac:spMkLst>
+        </pc:spChg>
+        <pc:spChg chg="add">
+          <ac:chgData name="Teruki Ito" userId="34785c0b-864e-41e6-9d6b-0f4b4aaf3c87" providerId="ADAL" clId="{6A8B257D-CF4F-4CFC-AE71-5629F4670AB1}" dt="2022-08-09T23:15:42.067" v="786" actId="26606"/>
+          <ac:spMkLst>
+            <pc:docMk/>
+            <pc:sldMk cId="2079537592" sldId="262"/>
+            <ac:spMk id="12" creationId="{72F84B47-E267-4194-8194-831DB7B5547F}"/>
+          </ac:spMkLst>
+        </pc:spChg>
+        <pc:picChg chg="add mod">
+          <ac:chgData name="Teruki Ito" userId="34785c0b-864e-41e6-9d6b-0f4b4aaf3c87" providerId="ADAL" clId="{6A8B257D-CF4F-4CFC-AE71-5629F4670AB1}" dt="2022-08-09T23:15:42.067" v="786" actId="26606"/>
+          <ac:picMkLst>
+            <pc:docMk/>
+            <pc:sldMk cId="2079537592" sldId="262"/>
+            <ac:picMk id="5" creationId="{456D500C-F576-C702-A0B2-D9D9257CC2E2}"/>
+          </ac:picMkLst>
+        </pc:picChg>
+      </pc:sldChg>
+      <pc:sldChg chg="addSp modSp new mod ord setBg">
+        <pc:chgData name="Teruki Ito" userId="34785c0b-864e-41e6-9d6b-0f4b4aaf3c87" providerId="ADAL" clId="{6A8B257D-CF4F-4CFC-AE71-5629F4670AB1}" dt="2022-08-09T23:15:03.364" v="639"/>
+        <pc:sldMkLst>
+          <pc:docMk/>
+          <pc:sldMk cId="568558080" sldId="263"/>
+        </pc:sldMkLst>
+        <pc:spChg chg="mod">
+          <ac:chgData name="Teruki Ito" userId="34785c0b-864e-41e6-9d6b-0f4b4aaf3c87" providerId="ADAL" clId="{6A8B257D-CF4F-4CFC-AE71-5629F4670AB1}" dt="2022-08-09T23:14:39.683" v="637" actId="26606"/>
+          <ac:spMkLst>
+            <pc:docMk/>
+            <pc:sldMk cId="568558080" sldId="263"/>
+            <ac:spMk id="2" creationId="{13AAB464-B761-8C06-BD03-5011F9A255B3}"/>
+          </ac:spMkLst>
+        </pc:spChg>
+        <pc:spChg chg="mod">
+          <ac:chgData name="Teruki Ito" userId="34785c0b-864e-41e6-9d6b-0f4b4aaf3c87" providerId="ADAL" clId="{6A8B257D-CF4F-4CFC-AE71-5629F4670AB1}" dt="2022-08-09T23:14:39.683" v="637" actId="26606"/>
+          <ac:spMkLst>
+            <pc:docMk/>
+            <pc:sldMk cId="568558080" sldId="263"/>
+            <ac:spMk id="3" creationId="{397EC198-7796-F687-4B9F-D09EE965C37D}"/>
+          </ac:spMkLst>
+        </pc:spChg>
+        <pc:spChg chg="add">
+          <ac:chgData name="Teruki Ito" userId="34785c0b-864e-41e6-9d6b-0f4b4aaf3c87" providerId="ADAL" clId="{6A8B257D-CF4F-4CFC-AE71-5629F4670AB1}" dt="2022-08-09T23:14:39.683" v="637" actId="26606"/>
+          <ac:spMkLst>
+            <pc:docMk/>
+            <pc:sldMk cId="568558080" sldId="263"/>
+            <ac:spMk id="10" creationId="{5E39A796-BE83-48B1-B33F-35C4A32AAB57}"/>
+          </ac:spMkLst>
+        </pc:spChg>
+        <pc:spChg chg="add">
+          <ac:chgData name="Teruki Ito" userId="34785c0b-864e-41e6-9d6b-0f4b4aaf3c87" providerId="ADAL" clId="{6A8B257D-CF4F-4CFC-AE71-5629F4670AB1}" dt="2022-08-09T23:14:39.683" v="637" actId="26606"/>
+          <ac:spMkLst>
+            <pc:docMk/>
+            <pc:sldMk cId="568558080" sldId="263"/>
+            <ac:spMk id="12" creationId="{72F84B47-E267-4194-8194-831DB7B5547F}"/>
+          </ac:spMkLst>
+        </pc:spChg>
+        <pc:picChg chg="add mod">
+          <ac:chgData name="Teruki Ito" userId="34785c0b-864e-41e6-9d6b-0f4b4aaf3c87" providerId="ADAL" clId="{6A8B257D-CF4F-4CFC-AE71-5629F4670AB1}" dt="2022-08-09T23:14:39.683" v="637" actId="26606"/>
+          <ac:picMkLst>
+            <pc:docMk/>
+            <pc:sldMk cId="568558080" sldId="263"/>
+            <ac:picMk id="5" creationId="{F7330FBE-5EB2-7AED-11C1-B0104193D301}"/>
+          </ac:picMkLst>
+        </pc:picChg>
+      </pc:sldChg>
+    </pc:docChg>
+  </pc:docChgLst>
+</pc:chgInfo>
+</file>
+
 <file path=ppt/slideLayouts/slideLayout1.xml><?xml version="1.0" encoding="utf-8"?>
 <p:sldLayout xmlns:a="http://schemas.openxmlformats.org/drawingml/2006/main" xmlns:r="http://schemas.openxmlformats.org/officeDocument/2006/relationships" xmlns:p="http://schemas.openxmlformats.org/presentationml/2006/main" type="title" preserve="1">
   <p:cSld name="Title Slide">
@@ -263,7 +539,7 @@
           <a:p>
             <a:fld id="{B25362A9-2B5C-4BCF-AC90-2610484F8087}" type="datetimeFigureOut">
               <a:rPr lang="en-US" smtClean="0"/>
-              <a:t>2022-08-08</a:t>
+              <a:t>2022-08-09</a:t>
             </a:fld>
             <a:endParaRPr lang="en-US"/>
           </a:p>
@@ -461,7 +737,7 @@
           <a:p>
             <a:fld id="{B25362A9-2B5C-4BCF-AC90-2610484F8087}" type="datetimeFigureOut">
               <a:rPr lang="en-US" smtClean="0"/>
-              <a:t>2022-08-08</a:t>
+              <a:t>2022-08-09</a:t>
             </a:fld>
             <a:endParaRPr lang="en-US"/>
           </a:p>
@@ -669,7 +945,7 @@
           <a:p>
             <a:fld id="{B25362A9-2B5C-4BCF-AC90-2610484F8087}" type="datetimeFigureOut">
               <a:rPr lang="en-US" smtClean="0"/>
-              <a:t>2022-08-08</a:t>
+              <a:t>2022-08-09</a:t>
             </a:fld>
             <a:endParaRPr lang="en-US"/>
           </a:p>
@@ -867,7 +1143,7 @@
           <a:p>
             <a:fld id="{B25362A9-2B5C-4BCF-AC90-2610484F8087}" type="datetimeFigureOut">
               <a:rPr lang="en-US" smtClean="0"/>
-              <a:t>2022-08-08</a:t>
+              <a:t>2022-08-09</a:t>
             </a:fld>
             <a:endParaRPr lang="en-US"/>
           </a:p>
@@ -1142,7 +1418,7 @@
           <a:p>
             <a:fld id="{B25362A9-2B5C-4BCF-AC90-2610484F8087}" type="datetimeFigureOut">
               <a:rPr lang="en-US" smtClean="0"/>
-              <a:t>2022-08-08</a:t>
+              <a:t>2022-08-09</a:t>
             </a:fld>
             <a:endParaRPr lang="en-US"/>
           </a:p>
@@ -1407,7 +1683,7 @@
           <a:p>
             <a:fld id="{B25362A9-2B5C-4BCF-AC90-2610484F8087}" type="datetimeFigureOut">
               <a:rPr lang="en-US" smtClean="0"/>
-              <a:t>2022-08-08</a:t>
+              <a:t>2022-08-09</a:t>
             </a:fld>
             <a:endParaRPr lang="en-US"/>
           </a:p>
@@ -1819,7 +2095,7 @@
           <a:p>
             <a:fld id="{B25362A9-2B5C-4BCF-AC90-2610484F8087}" type="datetimeFigureOut">
               <a:rPr lang="en-US" smtClean="0"/>
-              <a:t>2022-08-08</a:t>
+              <a:t>2022-08-09</a:t>
             </a:fld>
             <a:endParaRPr lang="en-US"/>
           </a:p>
@@ -1960,7 +2236,7 @@
           <a:p>
             <a:fld id="{B25362A9-2B5C-4BCF-AC90-2610484F8087}" type="datetimeFigureOut">
               <a:rPr lang="en-US" smtClean="0"/>
-              <a:t>2022-08-08</a:t>
+              <a:t>2022-08-09</a:t>
             </a:fld>
             <a:endParaRPr lang="en-US"/>
           </a:p>
@@ -2073,7 +2349,7 @@
           <a:p>
             <a:fld id="{B25362A9-2B5C-4BCF-AC90-2610484F8087}" type="datetimeFigureOut">
               <a:rPr lang="en-US" smtClean="0"/>
-              <a:t>2022-08-08</a:t>
+              <a:t>2022-08-09</a:t>
             </a:fld>
             <a:endParaRPr lang="en-US"/>
           </a:p>
@@ -2384,7 +2660,7 @@
           <a:p>
             <a:fld id="{B25362A9-2B5C-4BCF-AC90-2610484F8087}" type="datetimeFigureOut">
               <a:rPr lang="en-US" smtClean="0"/>
-              <a:t>2022-08-08</a:t>
+              <a:t>2022-08-09</a:t>
             </a:fld>
             <a:endParaRPr lang="en-US"/>
           </a:p>
@@ -2672,7 +2948,7 @@
           <a:p>
             <a:fld id="{B25362A9-2B5C-4BCF-AC90-2610484F8087}" type="datetimeFigureOut">
               <a:rPr lang="en-US" smtClean="0"/>
-              <a:t>2022-08-08</a:t>
+              <a:t>2022-08-09</a:t>
             </a:fld>
             <a:endParaRPr lang="en-US"/>
           </a:p>
@@ -2913,7 +3189,7 @@
           <a:p>
             <a:fld id="{B25362A9-2B5C-4BCF-AC90-2610484F8087}" type="datetimeFigureOut">
               <a:rPr lang="en-US" smtClean="0"/>
-              <a:t>2022-08-08</a:t>
+              <a:t>2022-08-09</a:t>
             </a:fld>
             <a:endParaRPr lang="en-US"/>
           </a:p>
@@ -3467,7 +3743,7 @@
           <a:p>
             <a:r>
               <a:rPr lang="en-US" dirty="0"/>
-              <a:t>Target Assured has taken a hit during the COVID pandemic</a:t>
+              <a:t>Travel Assured has taken a hit during the COVID pandemic</a:t>
             </a:r>
           </a:p>
           <a:p>
@@ -3479,13 +3755,14 @@
           <a:p>
             <a:r>
               <a:rPr lang="en-US" dirty="0"/>
-              <a:t>Can’t afford to create a blanket ad campaign that just targets all potential air </a:t>
-            </a:r>
-            <a:r>
-              <a:rPr lang="en-US" dirty="0" err="1"/>
-              <a:t>travellers</a:t>
-            </a:r>
-            <a:endParaRPr lang="en-US" dirty="0"/>
+              <a:t>Travel Assured afford to create a blanket ad campaign that just targets all potential air travelers</a:t>
+            </a:r>
+          </a:p>
+          <a:p>
+            <a:r>
+              <a:rPr lang="en-US" dirty="0"/>
+              <a:t>Travel Assured needs to fine tune its marketing towards those who are already more likely to buy travel insurance</a:t>
+            </a:r>
           </a:p>
         </p:txBody>
       </p:sp>
@@ -3556,8 +3833,8 @@
           <a:lstStyle/>
           <a:p>
             <a:r>
-              <a:rPr lang="en-US" sz="4100" dirty="0"/>
-              <a:t>Main Target: The Big Earners</a:t>
+              <a:rPr lang="en-US" sz="4100" b="1" dirty="0"/>
+              <a:t>The Big Earners</a:t>
             </a:r>
           </a:p>
         </p:txBody>
@@ -3632,7 +3909,7 @@
       </p:sp>
       <p:sp>
         <p:nvSpPr>
-          <p:cNvPr id="10" name="Rectangle 9">
+          <p:cNvPr id="30" name="Rectangle 29">
             <a:extLst>
               <a:ext uri="{FF2B5EF4-FFF2-40B4-BE49-F238E27FC236}">
                 <a16:creationId xmlns:a16="http://schemas.microsoft.com/office/drawing/2014/main" id="{5E39A796-BE83-48B1-B33F-35C4A32AAB57}"/>
@@ -3695,7 +3972,7 @@
       </p:sp>
       <p:sp>
         <p:nvSpPr>
-          <p:cNvPr id="12" name="Rounded Rectangle 9">
+          <p:cNvPr id="32" name="Rounded Rectangle 9">
             <a:extLst>
               <a:ext uri="{FF2B5EF4-FFF2-40B4-BE49-F238E27FC236}">
                 <a16:creationId xmlns:a16="http://schemas.microsoft.com/office/drawing/2014/main" id="{72F84B47-E267-4194-8194-831DB7B5547F}"/>
@@ -3820,6 +4097,14 @@
 <file path=ppt/slides/slide4.xml><?xml version="1.0" encoding="utf-8"?>
 <p:sld xmlns:a="http://schemas.openxmlformats.org/drawingml/2006/main" xmlns:r="http://schemas.openxmlformats.org/officeDocument/2006/relationships" xmlns:p="http://schemas.openxmlformats.org/presentationml/2006/main">
   <p:cSld>
+    <p:bg>
+      <p:bgPr>
+        <a:solidFill>
+          <a:schemeClr val="bg1"/>
+        </a:solidFill>
+        <a:effectLst/>
+      </p:bgPr>
+    </p:bg>
     <p:spTree>
       <p:nvGrpSpPr>
         <p:cNvPr id="1" name=""/>
@@ -3839,6 +4124,898 @@
           <p:cNvPr id="2" name="Title 1">
             <a:extLst>
               <a:ext uri="{FF2B5EF4-FFF2-40B4-BE49-F238E27FC236}">
+                <a16:creationId xmlns:a16="http://schemas.microsoft.com/office/drawing/2014/main" id="{DD7866C6-4E1F-F961-07D0-A71DCE6C6F4C}"/>
+              </a:ext>
+            </a:extLst>
+          </p:cNvPr>
+          <p:cNvSpPr>
+            <a:spLocks noGrp="1"/>
+          </p:cNvSpPr>
+          <p:nvPr>
+            <p:ph type="title"/>
+          </p:nvPr>
+        </p:nvSpPr>
+        <p:spPr>
+          <a:xfrm>
+            <a:off x="648929" y="629266"/>
+            <a:ext cx="3505495" cy="1622321"/>
+          </a:xfrm>
+        </p:spPr>
+        <p:txBody>
+          <a:bodyPr>
+            <a:normAutofit/>
+          </a:bodyPr>
+          <a:lstStyle/>
+          <a:p>
+            <a:r>
+              <a:rPr lang="en-US" b="1" dirty="0"/>
+              <a:t>Who Earns the Big Money?</a:t>
+            </a:r>
+          </a:p>
+        </p:txBody>
+      </p:sp>
+      <p:sp>
+        <p:nvSpPr>
+          <p:cNvPr id="3" name="Content Placeholder 2">
+            <a:extLst>
+              <a:ext uri="{FF2B5EF4-FFF2-40B4-BE49-F238E27FC236}">
+                <a16:creationId xmlns:a16="http://schemas.microsoft.com/office/drawing/2014/main" id="{0CA8BF37-DDAA-859C-308F-C3E399579D7C}"/>
+              </a:ext>
+            </a:extLst>
+          </p:cNvPr>
+          <p:cNvSpPr>
+            <a:spLocks noGrp="1"/>
+          </p:cNvSpPr>
+          <p:nvPr>
+            <p:ph idx="1"/>
+          </p:nvPr>
+        </p:nvSpPr>
+        <p:spPr>
+          <a:xfrm>
+            <a:off x="415636" y="2438400"/>
+            <a:ext cx="3940827" cy="3785419"/>
+          </a:xfrm>
+        </p:spPr>
+        <p:txBody>
+          <a:bodyPr>
+            <a:normAutofit/>
+          </a:bodyPr>
+          <a:lstStyle/>
+          <a:p>
+            <a:r>
+              <a:rPr lang="en-US" sz="2000" dirty="0"/>
+              <a:t>Those who work in the private sector or are self-employed earn more than those who work in the public sector</a:t>
+            </a:r>
+          </a:p>
+          <a:p>
+            <a:pPr lvl="1"/>
+            <a:r>
+              <a:rPr lang="en-US" sz="2000" dirty="0"/>
+              <a:t>Private-sector/self-employed customers earned 40% higher</a:t>
+            </a:r>
+          </a:p>
+          <a:p>
+            <a:pPr lvl="1"/>
+            <a:r>
+              <a:rPr lang="en-US" sz="2000" dirty="0"/>
+              <a:t>Median incomes </a:t>
+            </a:r>
+          </a:p>
+          <a:p>
+            <a:pPr lvl="2"/>
+            <a:r>
+              <a:rPr lang="en-US" dirty="0"/>
+              <a:t>Private-sector/self-employed customers: 1,016,196.19</a:t>
+            </a:r>
+          </a:p>
+          <a:p>
+            <a:pPr lvl="2"/>
+            <a:r>
+              <a:rPr lang="en-US" dirty="0"/>
+              <a:t>Public-sector customers: 725,350.88</a:t>
+            </a:r>
+          </a:p>
+        </p:txBody>
+      </p:sp>
+      <p:sp>
+        <p:nvSpPr>
+          <p:cNvPr id="10" name="Rectangle 9">
+            <a:extLst>
+              <a:ext uri="{FF2B5EF4-FFF2-40B4-BE49-F238E27FC236}">
+                <a16:creationId xmlns:a16="http://schemas.microsoft.com/office/drawing/2014/main" id="{5E39A796-BE83-48B1-B33F-35C4A32AAB57}"/>
+              </a:ext>
+              <a:ext uri="{C183D7F6-B498-43B3-948B-1728B52AA6E4}">
+                <adec:decorative xmlns:adec="http://schemas.microsoft.com/office/drawing/2017/decorative" val="1"/>
+              </a:ext>
+            </a:extLst>
+          </p:cNvPr>
+          <p:cNvSpPr>
+            <a:spLocks noGrp="1" noRot="1" noChangeAspect="1" noMove="1" noResize="1" noEditPoints="1" noAdjustHandles="1" noChangeArrowheads="1" noChangeShapeType="1" noTextEdit="1"/>
+          </p:cNvSpPr>
+          <p:nvPr>
+            <p:extLst>
+              <p:ext uri="{386F3935-93C4-4BCD-93E2-E3B085C9AB24}">
+                <p16:designElem xmlns:p16="http://schemas.microsoft.com/office/powerpoint/2015/main" val="1"/>
+              </p:ext>
+            </p:extLst>
+          </p:nvPr>
+        </p:nvSpPr>
+        <p:spPr>
+          <a:xfrm>
+            <a:off x="4639056" y="0"/>
+            <a:ext cx="7552944" cy="6858000"/>
+          </a:xfrm>
+          <a:prstGeom prst="rect">
+            <a:avLst/>
+          </a:prstGeom>
+          <a:solidFill>
+            <a:srgbClr val="C8CACA"/>
+          </a:solidFill>
+          <a:ln>
+            <a:noFill/>
+          </a:ln>
+        </p:spPr>
+        <p:style>
+          <a:lnRef idx="2">
+            <a:schemeClr val="accent1">
+              <a:shade val="50000"/>
+            </a:schemeClr>
+          </a:lnRef>
+          <a:fillRef idx="1">
+            <a:schemeClr val="accent1"/>
+          </a:fillRef>
+          <a:effectRef idx="0">
+            <a:schemeClr val="accent1"/>
+          </a:effectRef>
+          <a:fontRef idx="minor">
+            <a:schemeClr val="lt1"/>
+          </a:fontRef>
+        </p:style>
+        <p:txBody>
+          <a:bodyPr rtlCol="0" anchor="ctr"/>
+          <a:lstStyle/>
+          <a:p>
+            <a:pPr algn="ctr"/>
+            <a:endParaRPr lang="en-US"/>
+          </a:p>
+        </p:txBody>
+      </p:sp>
+      <p:sp>
+        <p:nvSpPr>
+          <p:cNvPr id="12" name="Rounded Rectangle 9">
+            <a:extLst>
+              <a:ext uri="{FF2B5EF4-FFF2-40B4-BE49-F238E27FC236}">
+                <a16:creationId xmlns:a16="http://schemas.microsoft.com/office/drawing/2014/main" id="{72F84B47-E267-4194-8194-831DB7B5547F}"/>
+              </a:ext>
+              <a:ext uri="{C183D7F6-B498-43B3-948B-1728B52AA6E4}">
+                <adec:decorative xmlns:adec="http://schemas.microsoft.com/office/drawing/2017/decorative" val="1"/>
+              </a:ext>
+            </a:extLst>
+          </p:cNvPr>
+          <p:cNvSpPr>
+            <a:spLocks noGrp="1" noRot="1" noChangeAspect="1" noMove="1" noResize="1" noEditPoints="1" noAdjustHandles="1" noChangeArrowheads="1" noChangeShapeType="1" noTextEdit="1"/>
+          </p:cNvSpPr>
+          <p:nvPr>
+            <p:extLst>
+              <p:ext uri="{386F3935-93C4-4BCD-93E2-E3B085C9AB24}">
+                <p16:designElem xmlns:p16="http://schemas.microsoft.com/office/powerpoint/2015/main" val="1"/>
+              </p:ext>
+            </p:extLst>
+          </p:nvPr>
+        </p:nvSpPr>
+        <p:spPr>
+          <a:xfrm>
+            <a:off x="5123688" y="557784"/>
+            <a:ext cx="6584098" cy="5739187"/>
+          </a:xfrm>
+          <a:prstGeom prst="roundRect">
+            <a:avLst>
+              <a:gd name="adj" fmla="val 0"/>
+            </a:avLst>
+          </a:prstGeom>
+          <a:solidFill>
+            <a:srgbClr val="FFFFFF"/>
+          </a:solidFill>
+          <a:ln w="9525">
+            <a:solidFill>
+              <a:srgbClr val="C8CACA"/>
+            </a:solidFill>
+          </a:ln>
+          <a:effectLst>
+            <a:outerShdw blurRad="57150" dist="19050" dir="5400000" algn="t" rotWithShape="0">
+              <a:prstClr val="black">
+                <a:alpha val="63000"/>
+              </a:prstClr>
+            </a:outerShdw>
+          </a:effectLst>
+        </p:spPr>
+        <p:style>
+          <a:lnRef idx="2">
+            <a:schemeClr val="accent1">
+              <a:shade val="50000"/>
+            </a:schemeClr>
+          </a:lnRef>
+          <a:fillRef idx="1">
+            <a:schemeClr val="accent1"/>
+          </a:fillRef>
+          <a:effectRef idx="0">
+            <a:schemeClr val="accent1"/>
+          </a:effectRef>
+          <a:fontRef idx="minor">
+            <a:schemeClr val="lt1"/>
+          </a:fontRef>
+        </p:style>
+        <p:txBody>
+          <a:bodyPr rtlCol="0" anchor="ctr"/>
+          <a:lstStyle/>
+          <a:p>
+            <a:pPr algn="ctr"/>
+            <a:endParaRPr lang="en-US"/>
+          </a:p>
+        </p:txBody>
+      </p:sp>
+      <p:pic>
+        <p:nvPicPr>
+          <p:cNvPr id="5" name="Picture 4" descr="Chart, box and whisker chart&#10;&#10;Description automatically generated">
+            <a:extLst>
+              <a:ext uri="{FF2B5EF4-FFF2-40B4-BE49-F238E27FC236}">
+                <a16:creationId xmlns:a16="http://schemas.microsoft.com/office/drawing/2014/main" id="{3D8C7981-C153-CE9A-8178-1935D3D1298B}"/>
+              </a:ext>
+            </a:extLst>
+          </p:cNvPr>
+          <p:cNvPicPr>
+            <a:picLocks noChangeAspect="1"/>
+          </p:cNvPicPr>
+          <p:nvPr/>
+        </p:nvPicPr>
+        <p:blipFill>
+          <a:blip r:embed="rId2">
+            <a:extLst>
+              <a:ext uri="{28A0092B-C50C-407E-A947-70E740481C1C}">
+                <a14:useLocalDpi xmlns:a14="http://schemas.microsoft.com/office/drawing/2010/main" val="0"/>
+              </a:ext>
+            </a:extLst>
+          </a:blip>
+          <a:stretch>
+            <a:fillRect/>
+          </a:stretch>
+        </p:blipFill>
+        <p:spPr>
+          <a:xfrm>
+            <a:off x="5405862" y="1624486"/>
+            <a:ext cx="6019331" cy="3605782"/>
+          </a:xfrm>
+          <a:prstGeom prst="rect">
+            <a:avLst/>
+          </a:prstGeom>
+          <a:effectLst/>
+        </p:spPr>
+      </p:pic>
+    </p:spTree>
+    <p:extLst>
+      <p:ext uri="{BB962C8B-B14F-4D97-AF65-F5344CB8AC3E}">
+        <p14:creationId xmlns:p14="http://schemas.microsoft.com/office/powerpoint/2010/main" val="2812457247"/>
+      </p:ext>
+    </p:extLst>
+  </p:cSld>
+  <p:clrMapOvr>
+    <a:masterClrMapping/>
+  </p:clrMapOvr>
+</p:sld>
+</file>
+
+<file path=ppt/slides/slide5.xml><?xml version="1.0" encoding="utf-8"?>
+<p:sld xmlns:a="http://schemas.openxmlformats.org/drawingml/2006/main" xmlns:r="http://schemas.openxmlformats.org/officeDocument/2006/relationships" xmlns:p="http://schemas.openxmlformats.org/presentationml/2006/main">
+  <p:cSld>
+    <p:bg>
+      <p:bgPr>
+        <a:solidFill>
+          <a:schemeClr val="bg1"/>
+        </a:solidFill>
+        <a:effectLst/>
+      </p:bgPr>
+    </p:bg>
+    <p:spTree>
+      <p:nvGrpSpPr>
+        <p:cNvPr id="1" name=""/>
+        <p:cNvGrpSpPr/>
+        <p:nvPr/>
+      </p:nvGrpSpPr>
+      <p:grpSpPr>
+        <a:xfrm>
+          <a:off x="0" y="0"/>
+          <a:ext cx="0" cy="0"/>
+          <a:chOff x="0" y="0"/>
+          <a:chExt cx="0" cy="0"/>
+        </a:xfrm>
+      </p:grpSpPr>
+      <p:sp>
+        <p:nvSpPr>
+          <p:cNvPr id="2" name="Title 1">
+            <a:extLst>
+              <a:ext uri="{FF2B5EF4-FFF2-40B4-BE49-F238E27FC236}">
+                <a16:creationId xmlns:a16="http://schemas.microsoft.com/office/drawing/2014/main" id="{13AAB464-B761-8C06-BD03-5011F9A255B3}"/>
+              </a:ext>
+            </a:extLst>
+          </p:cNvPr>
+          <p:cNvSpPr>
+            <a:spLocks noGrp="1"/>
+          </p:cNvSpPr>
+          <p:nvPr>
+            <p:ph type="title"/>
+          </p:nvPr>
+        </p:nvSpPr>
+        <p:spPr>
+          <a:xfrm>
+            <a:off x="648929" y="629266"/>
+            <a:ext cx="3505495" cy="1622321"/>
+          </a:xfrm>
+        </p:spPr>
+        <p:txBody>
+          <a:bodyPr>
+            <a:normAutofit/>
+          </a:bodyPr>
+          <a:lstStyle/>
+          <a:p>
+            <a:r>
+              <a:rPr lang="en-US" dirty="0"/>
+              <a:t>Frequent Flyers</a:t>
+            </a:r>
+          </a:p>
+        </p:txBody>
+      </p:sp>
+      <p:sp>
+        <p:nvSpPr>
+          <p:cNvPr id="3" name="Content Placeholder 2">
+            <a:extLst>
+              <a:ext uri="{FF2B5EF4-FFF2-40B4-BE49-F238E27FC236}">
+                <a16:creationId xmlns:a16="http://schemas.microsoft.com/office/drawing/2014/main" id="{397EC198-7796-F687-4B9F-D09EE965C37D}"/>
+              </a:ext>
+            </a:extLst>
+          </p:cNvPr>
+          <p:cNvSpPr>
+            <a:spLocks noGrp="1"/>
+          </p:cNvSpPr>
+          <p:nvPr>
+            <p:ph idx="1"/>
+          </p:nvPr>
+        </p:nvSpPr>
+        <p:spPr>
+          <a:xfrm>
+            <a:off x="648931" y="2438400"/>
+            <a:ext cx="3505494" cy="3785419"/>
+          </a:xfrm>
+        </p:spPr>
+        <p:txBody>
+          <a:bodyPr>
+            <a:normAutofit/>
+          </a:bodyPr>
+          <a:lstStyle/>
+          <a:p>
+            <a:r>
+              <a:rPr lang="en-US" sz="2000" dirty="0"/>
+              <a:t>Frequent flyers tend to buy travel insurance policies more than non-frequent flyers do</a:t>
+            </a:r>
+          </a:p>
+          <a:p>
+            <a:pPr lvl="1"/>
+            <a:r>
+              <a:rPr lang="en-US" sz="2000" dirty="0"/>
+              <a:t>57% of frequent flyers</a:t>
+            </a:r>
+          </a:p>
+          <a:p>
+            <a:pPr lvl="1"/>
+            <a:r>
+              <a:rPr lang="en-US" sz="2000" dirty="0"/>
+              <a:t>30% of non-frequent flyers</a:t>
+            </a:r>
+          </a:p>
+        </p:txBody>
+      </p:sp>
+      <p:sp>
+        <p:nvSpPr>
+          <p:cNvPr id="10" name="Rectangle 9">
+            <a:extLst>
+              <a:ext uri="{FF2B5EF4-FFF2-40B4-BE49-F238E27FC236}">
+                <a16:creationId xmlns:a16="http://schemas.microsoft.com/office/drawing/2014/main" id="{5E39A796-BE83-48B1-B33F-35C4A32AAB57}"/>
+              </a:ext>
+              <a:ext uri="{C183D7F6-B498-43B3-948B-1728B52AA6E4}">
+                <adec:decorative xmlns:adec="http://schemas.microsoft.com/office/drawing/2017/decorative" val="1"/>
+              </a:ext>
+            </a:extLst>
+          </p:cNvPr>
+          <p:cNvSpPr>
+            <a:spLocks noGrp="1" noRot="1" noChangeAspect="1" noMove="1" noResize="1" noEditPoints="1" noAdjustHandles="1" noChangeArrowheads="1" noChangeShapeType="1" noTextEdit="1"/>
+          </p:cNvSpPr>
+          <p:nvPr>
+            <p:extLst>
+              <p:ext uri="{386F3935-93C4-4BCD-93E2-E3B085C9AB24}">
+                <p16:designElem xmlns:p16="http://schemas.microsoft.com/office/powerpoint/2015/main" val="1"/>
+              </p:ext>
+            </p:extLst>
+          </p:nvPr>
+        </p:nvSpPr>
+        <p:spPr>
+          <a:xfrm>
+            <a:off x="4639056" y="0"/>
+            <a:ext cx="7552944" cy="6858000"/>
+          </a:xfrm>
+          <a:prstGeom prst="rect">
+            <a:avLst/>
+          </a:prstGeom>
+          <a:solidFill>
+            <a:srgbClr val="C8CACA"/>
+          </a:solidFill>
+          <a:ln>
+            <a:noFill/>
+          </a:ln>
+        </p:spPr>
+        <p:style>
+          <a:lnRef idx="2">
+            <a:schemeClr val="accent1">
+              <a:shade val="50000"/>
+            </a:schemeClr>
+          </a:lnRef>
+          <a:fillRef idx="1">
+            <a:schemeClr val="accent1"/>
+          </a:fillRef>
+          <a:effectRef idx="0">
+            <a:schemeClr val="accent1"/>
+          </a:effectRef>
+          <a:fontRef idx="minor">
+            <a:schemeClr val="lt1"/>
+          </a:fontRef>
+        </p:style>
+        <p:txBody>
+          <a:bodyPr rtlCol="0" anchor="ctr"/>
+          <a:lstStyle/>
+          <a:p>
+            <a:pPr algn="ctr"/>
+            <a:endParaRPr lang="en-US"/>
+          </a:p>
+        </p:txBody>
+      </p:sp>
+      <p:sp>
+        <p:nvSpPr>
+          <p:cNvPr id="12" name="Rounded Rectangle 9">
+            <a:extLst>
+              <a:ext uri="{FF2B5EF4-FFF2-40B4-BE49-F238E27FC236}">
+                <a16:creationId xmlns:a16="http://schemas.microsoft.com/office/drawing/2014/main" id="{72F84B47-E267-4194-8194-831DB7B5547F}"/>
+              </a:ext>
+              <a:ext uri="{C183D7F6-B498-43B3-948B-1728B52AA6E4}">
+                <adec:decorative xmlns:adec="http://schemas.microsoft.com/office/drawing/2017/decorative" val="1"/>
+              </a:ext>
+            </a:extLst>
+          </p:cNvPr>
+          <p:cNvSpPr>
+            <a:spLocks noGrp="1" noRot="1" noChangeAspect="1" noMove="1" noResize="1" noEditPoints="1" noAdjustHandles="1" noChangeArrowheads="1" noChangeShapeType="1" noTextEdit="1"/>
+          </p:cNvSpPr>
+          <p:nvPr>
+            <p:extLst>
+              <p:ext uri="{386F3935-93C4-4BCD-93E2-E3B085C9AB24}">
+                <p16:designElem xmlns:p16="http://schemas.microsoft.com/office/powerpoint/2015/main" val="1"/>
+              </p:ext>
+            </p:extLst>
+          </p:nvPr>
+        </p:nvSpPr>
+        <p:spPr>
+          <a:xfrm>
+            <a:off x="5123688" y="557784"/>
+            <a:ext cx="6584098" cy="5739187"/>
+          </a:xfrm>
+          <a:prstGeom prst="roundRect">
+            <a:avLst>
+              <a:gd name="adj" fmla="val 0"/>
+            </a:avLst>
+          </a:prstGeom>
+          <a:solidFill>
+            <a:srgbClr val="FFFFFF"/>
+          </a:solidFill>
+          <a:ln w="9525">
+            <a:solidFill>
+              <a:srgbClr val="C8CACA"/>
+            </a:solidFill>
+          </a:ln>
+          <a:effectLst>
+            <a:outerShdw blurRad="57150" dist="19050" dir="5400000" algn="t" rotWithShape="0">
+              <a:prstClr val="black">
+                <a:alpha val="63000"/>
+              </a:prstClr>
+            </a:outerShdw>
+          </a:effectLst>
+        </p:spPr>
+        <p:style>
+          <a:lnRef idx="2">
+            <a:schemeClr val="accent1">
+              <a:shade val="50000"/>
+            </a:schemeClr>
+          </a:lnRef>
+          <a:fillRef idx="1">
+            <a:schemeClr val="accent1"/>
+          </a:fillRef>
+          <a:effectRef idx="0">
+            <a:schemeClr val="accent1"/>
+          </a:effectRef>
+          <a:fontRef idx="minor">
+            <a:schemeClr val="lt1"/>
+          </a:fontRef>
+        </p:style>
+        <p:txBody>
+          <a:bodyPr rtlCol="0" anchor="ctr"/>
+          <a:lstStyle/>
+          <a:p>
+            <a:pPr algn="ctr"/>
+            <a:endParaRPr lang="en-US"/>
+          </a:p>
+        </p:txBody>
+      </p:sp>
+      <p:pic>
+        <p:nvPicPr>
+          <p:cNvPr id="4" name="Picture 3" descr="Chart, bar chart&#10;&#10;Description automatically generated">
+            <a:extLst>
+              <a:ext uri="{FF2B5EF4-FFF2-40B4-BE49-F238E27FC236}">
+                <a16:creationId xmlns:a16="http://schemas.microsoft.com/office/drawing/2014/main" id="{0D56F485-69A5-DDC3-2082-C928779C3DF1}"/>
+              </a:ext>
+            </a:extLst>
+          </p:cNvPr>
+          <p:cNvPicPr>
+            <a:picLocks noChangeAspect="1"/>
+          </p:cNvPicPr>
+          <p:nvPr/>
+        </p:nvPicPr>
+        <p:blipFill>
+          <a:blip r:embed="rId2">
+            <a:extLst>
+              <a:ext uri="{28A0092B-C50C-407E-A947-70E740481C1C}">
+                <a14:useLocalDpi xmlns:a14="http://schemas.microsoft.com/office/drawing/2010/main" val="0"/>
+              </a:ext>
+            </a:extLst>
+          </a:blip>
+          <a:stretch>
+            <a:fillRect/>
+          </a:stretch>
+        </p:blipFill>
+        <p:spPr>
+          <a:xfrm>
+            <a:off x="5565026" y="1641439"/>
+            <a:ext cx="5701003" cy="3781425"/>
+          </a:xfrm>
+          <a:prstGeom prst="rect">
+            <a:avLst/>
+          </a:prstGeom>
+        </p:spPr>
+      </p:pic>
+    </p:spTree>
+    <p:extLst>
+      <p:ext uri="{BB962C8B-B14F-4D97-AF65-F5344CB8AC3E}">
+        <p14:creationId xmlns:p14="http://schemas.microsoft.com/office/powerpoint/2010/main" val="568558080"/>
+      </p:ext>
+    </p:extLst>
+  </p:cSld>
+  <p:clrMapOvr>
+    <a:masterClrMapping/>
+  </p:clrMapOvr>
+</p:sld>
+</file>
+
+<file path=ppt/slides/slide6.xml><?xml version="1.0" encoding="utf-8"?>
+<p:sld xmlns:a="http://schemas.openxmlformats.org/drawingml/2006/main" xmlns:r="http://schemas.openxmlformats.org/officeDocument/2006/relationships" xmlns:p="http://schemas.openxmlformats.org/presentationml/2006/main">
+  <p:cSld>
+    <p:bg>
+      <p:bgPr>
+        <a:solidFill>
+          <a:schemeClr val="bg1"/>
+        </a:solidFill>
+        <a:effectLst/>
+      </p:bgPr>
+    </p:bg>
+    <p:spTree>
+      <p:nvGrpSpPr>
+        <p:cNvPr id="1" name=""/>
+        <p:cNvGrpSpPr/>
+        <p:nvPr/>
+      </p:nvGrpSpPr>
+      <p:grpSpPr>
+        <a:xfrm>
+          <a:off x="0" y="0"/>
+          <a:ext cx="0" cy="0"/>
+          <a:chOff x="0" y="0"/>
+          <a:chExt cx="0" cy="0"/>
+        </a:xfrm>
+      </p:grpSpPr>
+      <p:sp>
+        <p:nvSpPr>
+          <p:cNvPr id="2" name="Title 1">
+            <a:extLst>
+              <a:ext uri="{FF2B5EF4-FFF2-40B4-BE49-F238E27FC236}">
+                <a16:creationId xmlns:a16="http://schemas.microsoft.com/office/drawing/2014/main" id="{0A0DAE92-6C2C-AE9B-5903-A965DA9E260E}"/>
+              </a:ext>
+            </a:extLst>
+          </p:cNvPr>
+          <p:cNvSpPr>
+            <a:spLocks noGrp="1"/>
+          </p:cNvSpPr>
+          <p:nvPr>
+            <p:ph type="title"/>
+          </p:nvPr>
+        </p:nvSpPr>
+        <p:spPr>
+          <a:xfrm>
+            <a:off x="648929" y="629266"/>
+            <a:ext cx="3505495" cy="1622321"/>
+          </a:xfrm>
+        </p:spPr>
+        <p:txBody>
+          <a:bodyPr>
+            <a:normAutofit/>
+          </a:bodyPr>
+          <a:lstStyle/>
+          <a:p>
+            <a:r>
+              <a:rPr lang="en-US" dirty="0"/>
+              <a:t>Foreign Travel</a:t>
+            </a:r>
+          </a:p>
+        </p:txBody>
+      </p:sp>
+      <p:sp>
+        <p:nvSpPr>
+          <p:cNvPr id="3" name="Content Placeholder 2">
+            <a:extLst>
+              <a:ext uri="{FF2B5EF4-FFF2-40B4-BE49-F238E27FC236}">
+                <a16:creationId xmlns:a16="http://schemas.microsoft.com/office/drawing/2014/main" id="{0A0B7B8E-9911-7031-B9F6-E0A3F618EDCB}"/>
+              </a:ext>
+            </a:extLst>
+          </p:cNvPr>
+          <p:cNvSpPr>
+            <a:spLocks noGrp="1"/>
+          </p:cNvSpPr>
+          <p:nvPr>
+            <p:ph idx="1"/>
+          </p:nvPr>
+        </p:nvSpPr>
+        <p:spPr>
+          <a:xfrm>
+            <a:off x="648931" y="2438400"/>
+            <a:ext cx="3505494" cy="3785419"/>
+          </a:xfrm>
+        </p:spPr>
+        <p:txBody>
+          <a:bodyPr>
+            <a:normAutofit/>
+          </a:bodyPr>
+          <a:lstStyle/>
+          <a:p>
+            <a:r>
+              <a:rPr lang="en-US" sz="2000" dirty="0"/>
+              <a:t>Those who have travelled abroad tend to by travel insurance more than those who haven’t travelled abroad</a:t>
+            </a:r>
+          </a:p>
+          <a:p>
+            <a:pPr lvl="1"/>
+            <a:r>
+              <a:rPr lang="en-US" sz="2000" dirty="0"/>
+              <a:t>Have travelled abroad and purchased insurance: 78%</a:t>
+            </a:r>
+          </a:p>
+          <a:p>
+            <a:pPr lvl="1"/>
+            <a:r>
+              <a:rPr lang="en-US" sz="2000" dirty="0"/>
+              <a:t>Haven’t travelled abroad and purchased insurance: 25% </a:t>
+            </a:r>
+          </a:p>
+        </p:txBody>
+      </p:sp>
+      <p:sp>
+        <p:nvSpPr>
+          <p:cNvPr id="10" name="Rectangle 9">
+            <a:extLst>
+              <a:ext uri="{FF2B5EF4-FFF2-40B4-BE49-F238E27FC236}">
+                <a16:creationId xmlns:a16="http://schemas.microsoft.com/office/drawing/2014/main" id="{5E39A796-BE83-48B1-B33F-35C4A32AAB57}"/>
+              </a:ext>
+              <a:ext uri="{C183D7F6-B498-43B3-948B-1728B52AA6E4}">
+                <adec:decorative xmlns:adec="http://schemas.microsoft.com/office/drawing/2017/decorative" val="1"/>
+              </a:ext>
+            </a:extLst>
+          </p:cNvPr>
+          <p:cNvSpPr>
+            <a:spLocks noGrp="1" noRot="1" noChangeAspect="1" noMove="1" noResize="1" noEditPoints="1" noAdjustHandles="1" noChangeArrowheads="1" noChangeShapeType="1" noTextEdit="1"/>
+          </p:cNvSpPr>
+          <p:nvPr>
+            <p:extLst>
+              <p:ext uri="{386F3935-93C4-4BCD-93E2-E3B085C9AB24}">
+                <p16:designElem xmlns:p16="http://schemas.microsoft.com/office/powerpoint/2015/main" val="1"/>
+              </p:ext>
+            </p:extLst>
+          </p:nvPr>
+        </p:nvSpPr>
+        <p:spPr>
+          <a:xfrm>
+            <a:off x="4639056" y="0"/>
+            <a:ext cx="7552944" cy="6858000"/>
+          </a:xfrm>
+          <a:prstGeom prst="rect">
+            <a:avLst/>
+          </a:prstGeom>
+          <a:solidFill>
+            <a:srgbClr val="C8CACA"/>
+          </a:solidFill>
+          <a:ln>
+            <a:noFill/>
+          </a:ln>
+        </p:spPr>
+        <p:style>
+          <a:lnRef idx="2">
+            <a:schemeClr val="accent1">
+              <a:shade val="50000"/>
+            </a:schemeClr>
+          </a:lnRef>
+          <a:fillRef idx="1">
+            <a:schemeClr val="accent1"/>
+          </a:fillRef>
+          <a:effectRef idx="0">
+            <a:schemeClr val="accent1"/>
+          </a:effectRef>
+          <a:fontRef idx="minor">
+            <a:schemeClr val="lt1"/>
+          </a:fontRef>
+        </p:style>
+        <p:txBody>
+          <a:bodyPr rtlCol="0" anchor="ctr"/>
+          <a:lstStyle/>
+          <a:p>
+            <a:pPr algn="ctr"/>
+            <a:endParaRPr lang="en-US"/>
+          </a:p>
+        </p:txBody>
+      </p:sp>
+      <p:sp>
+        <p:nvSpPr>
+          <p:cNvPr id="12" name="Rounded Rectangle 9">
+            <a:extLst>
+              <a:ext uri="{FF2B5EF4-FFF2-40B4-BE49-F238E27FC236}">
+                <a16:creationId xmlns:a16="http://schemas.microsoft.com/office/drawing/2014/main" id="{72F84B47-E267-4194-8194-831DB7B5547F}"/>
+              </a:ext>
+              <a:ext uri="{C183D7F6-B498-43B3-948B-1728B52AA6E4}">
+                <adec:decorative xmlns:adec="http://schemas.microsoft.com/office/drawing/2017/decorative" val="1"/>
+              </a:ext>
+            </a:extLst>
+          </p:cNvPr>
+          <p:cNvSpPr>
+            <a:spLocks noGrp="1" noRot="1" noChangeAspect="1" noMove="1" noResize="1" noEditPoints="1" noAdjustHandles="1" noChangeArrowheads="1" noChangeShapeType="1" noTextEdit="1"/>
+          </p:cNvSpPr>
+          <p:nvPr>
+            <p:extLst>
+              <p:ext uri="{386F3935-93C4-4BCD-93E2-E3B085C9AB24}">
+                <p16:designElem xmlns:p16="http://schemas.microsoft.com/office/powerpoint/2015/main" val="1"/>
+              </p:ext>
+            </p:extLst>
+          </p:nvPr>
+        </p:nvSpPr>
+        <p:spPr>
+          <a:xfrm>
+            <a:off x="5123688" y="557784"/>
+            <a:ext cx="6584098" cy="5739187"/>
+          </a:xfrm>
+          <a:prstGeom prst="roundRect">
+            <a:avLst>
+              <a:gd name="adj" fmla="val 0"/>
+            </a:avLst>
+          </a:prstGeom>
+          <a:solidFill>
+            <a:srgbClr val="FFFFFF"/>
+          </a:solidFill>
+          <a:ln w="9525">
+            <a:solidFill>
+              <a:srgbClr val="C8CACA"/>
+            </a:solidFill>
+          </a:ln>
+          <a:effectLst>
+            <a:outerShdw blurRad="57150" dist="19050" dir="5400000" algn="t" rotWithShape="0">
+              <a:prstClr val="black">
+                <a:alpha val="63000"/>
+              </a:prstClr>
+            </a:outerShdw>
+          </a:effectLst>
+        </p:spPr>
+        <p:style>
+          <a:lnRef idx="2">
+            <a:schemeClr val="accent1">
+              <a:shade val="50000"/>
+            </a:schemeClr>
+          </a:lnRef>
+          <a:fillRef idx="1">
+            <a:schemeClr val="accent1"/>
+          </a:fillRef>
+          <a:effectRef idx="0">
+            <a:schemeClr val="accent1"/>
+          </a:effectRef>
+          <a:fontRef idx="minor">
+            <a:schemeClr val="lt1"/>
+          </a:fontRef>
+        </p:style>
+        <p:txBody>
+          <a:bodyPr rtlCol="0" anchor="ctr"/>
+          <a:lstStyle/>
+          <a:p>
+            <a:pPr algn="ctr"/>
+            <a:endParaRPr lang="en-US"/>
+          </a:p>
+        </p:txBody>
+      </p:sp>
+      <p:pic>
+        <p:nvPicPr>
+          <p:cNvPr id="9" name="Picture 8" descr="Chart, bar chart&#10;&#10;Description automatically generated">
+            <a:extLst>
+              <a:ext uri="{FF2B5EF4-FFF2-40B4-BE49-F238E27FC236}">
+                <a16:creationId xmlns:a16="http://schemas.microsoft.com/office/drawing/2014/main" id="{F066F8D9-553C-62E2-7905-3484880AEC0A}"/>
+              </a:ext>
+            </a:extLst>
+          </p:cNvPr>
+          <p:cNvPicPr>
+            <a:picLocks noChangeAspect="1"/>
+          </p:cNvPicPr>
+          <p:nvPr/>
+        </p:nvPicPr>
+        <p:blipFill>
+          <a:blip r:embed="rId2">
+            <a:extLst>
+              <a:ext uri="{28A0092B-C50C-407E-A947-70E740481C1C}">
+                <a14:useLocalDpi xmlns:a14="http://schemas.microsoft.com/office/drawing/2010/main" val="0"/>
+              </a:ext>
+            </a:extLst>
+          </a:blip>
+          <a:stretch>
+            <a:fillRect/>
+          </a:stretch>
+        </p:blipFill>
+        <p:spPr>
+          <a:xfrm>
+            <a:off x="5560933" y="1603754"/>
+            <a:ext cx="5710004" cy="3787395"/>
+          </a:xfrm>
+          <a:prstGeom prst="rect">
+            <a:avLst/>
+          </a:prstGeom>
+        </p:spPr>
+      </p:pic>
+    </p:spTree>
+    <p:extLst>
+      <p:ext uri="{BB962C8B-B14F-4D97-AF65-F5344CB8AC3E}">
+        <p14:creationId xmlns:p14="http://schemas.microsoft.com/office/powerpoint/2010/main" val="2079537592"/>
+      </p:ext>
+    </p:extLst>
+  </p:cSld>
+  <p:clrMapOvr>
+    <a:masterClrMapping/>
+  </p:clrMapOvr>
+</p:sld>
+</file>
+
+<file path=ppt/slides/slide7.xml><?xml version="1.0" encoding="utf-8"?>
+<p:sld xmlns:a="http://schemas.openxmlformats.org/drawingml/2006/main" xmlns:r="http://schemas.openxmlformats.org/officeDocument/2006/relationships" xmlns:p="http://schemas.openxmlformats.org/presentationml/2006/main">
+  <p:cSld>
+    <p:spTree>
+      <p:nvGrpSpPr>
+        <p:cNvPr id="1" name=""/>
+        <p:cNvGrpSpPr/>
+        <p:nvPr/>
+      </p:nvGrpSpPr>
+      <p:grpSpPr>
+        <a:xfrm>
+          <a:off x="0" y="0"/>
+          <a:ext cx="0" cy="0"/>
+          <a:chOff x="0" y="0"/>
+          <a:chExt cx="0" cy="0"/>
+        </a:xfrm>
+      </p:grpSpPr>
+      <p:sp>
+        <p:nvSpPr>
+          <p:cNvPr id="2" name="Title 1">
+            <a:extLst>
+              <a:ext uri="{FF2B5EF4-FFF2-40B4-BE49-F238E27FC236}">
                 <a16:creationId xmlns:a16="http://schemas.microsoft.com/office/drawing/2014/main" id="{7602E867-DC5D-BD6E-D304-E561A74D1D2E}"/>
               </a:ext>
             </a:extLst>
@@ -3891,15 +5068,12 @@
           <a:p>
             <a:pPr lvl="1"/>
             <a:r>
+              <a:rPr lang="en-US"/>
+              <a:t>Those </a:t>
+            </a:r>
+            <a:r>
               <a:rPr lang="en-US" dirty="0"/>
-              <a:t>Hard to discern who earns more</a:t>
-            </a:r>
-          </a:p>
-          <a:p>
-            <a:pPr lvl="1"/>
-            <a:r>
-              <a:rPr lang="en-US" dirty="0"/>
-              <a:t>Those who work in the private sector or are self employed earn more than those in the public sector</a:t>
+              <a:t>who work in the private sector or are self employed earn more than those in the public sector</a:t>
             </a:r>
           </a:p>
           <a:p>
@@ -3935,7 +5109,7 @@
 </p:sld>
 </file>
 
-<file path=ppt/slides/slide5.xml><?xml version="1.0" encoding="utf-8"?>
+<file path=ppt/slides/slide8.xml><?xml version="1.0" encoding="utf-8"?>
 <p:sld xmlns:a="http://schemas.openxmlformats.org/drawingml/2006/main" xmlns:r="http://schemas.openxmlformats.org/officeDocument/2006/relationships" xmlns:p="http://schemas.openxmlformats.org/presentationml/2006/main">
   <p:cSld>
     <p:spTree>

</xml_diff>

<commit_message>
fixed errors in slide
</commit_message>
<xml_diff>
--- a/resources/Travel_Insurance_Presentation.pptx
+++ b/resources/Travel_Insurance_Presentation.pptx
@@ -3755,13 +3755,13 @@
           <a:p>
             <a:r>
               <a:rPr lang="en-US" dirty="0"/>
-              <a:t>Travel Assured afford to create a blanket ad campaign that just targets all potential air travelers</a:t>
+              <a:t>Travel Assured can’t afford to create a blanket ad campaign that just targets all potential air travelers</a:t>
             </a:r>
           </a:p>
           <a:p>
             <a:r>
               <a:rPr lang="en-US" dirty="0"/>
-              <a:t>Travel Assured needs to fine tune its marketing towards those who are already more likely to buy travel insurance</a:t>
+              <a:t>Travel Assured needs to fine tune its marketing towards those who are already likely to buy travel insurance</a:t>
             </a:r>
           </a:p>
         </p:txBody>
@@ -4191,7 +4191,7 @@
             <a:pPr lvl="1"/>
             <a:r>
               <a:rPr lang="en-US" sz="2000" dirty="0"/>
-              <a:t>Private-sector/self-employed customers earned 40% higher</a:t>
+              <a:t>Private-sector/self-employed customers earned 50% higher</a:t>
             </a:r>
           </a:p>
           <a:p>
@@ -4205,14 +4205,14 @@
             <a:pPr lvl="2"/>
             <a:r>
               <a:rPr lang="en-US" dirty="0"/>
-              <a:t>Private-sector/self-employed customers: 1,016,196.19</a:t>
+              <a:t>Private-sector/self-employed customers: 1,050,000</a:t>
             </a:r>
           </a:p>
           <a:p>
             <a:pPr lvl="2"/>
             <a:r>
               <a:rPr lang="en-US" dirty="0"/>
-              <a:t>Public-sector customers: 725,350.88</a:t>
+              <a:t>Public-sector customers: 700,000</a:t>
             </a:r>
           </a:p>
         </p:txBody>
@@ -5149,7 +5149,14 @@
           <a:p>
             <a:r>
               <a:rPr lang="en-US" dirty="0"/>
-              <a:t>Further Exploration – What More Data Do We Need?</a:t>
+              <a:t>Further Exploration </a:t>
+            </a:r>
+            <a:br>
+              <a:rPr lang="en-US" dirty="0"/>
+            </a:br>
+            <a:r>
+              <a:rPr lang="en-US" sz="4000" dirty="0"/>
+              <a:t>What Else Should We Look At?</a:t>
             </a:r>
           </a:p>
         </p:txBody>
@@ -5177,7 +5184,7 @@
           <a:p>
             <a:r>
               <a:rPr lang="en-US" dirty="0"/>
-              <a:t>Customers’ ages and years of employment:</a:t>
+              <a:t>Customers’ ages and years of employment: Do customers who are older and further in their careers tend to buy insurance more?</a:t>
             </a:r>
             <a:br>
               <a:rPr lang="en-US" dirty="0"/>
@@ -5187,7 +5194,7 @@
           <a:p>
             <a:r>
               <a:rPr lang="en-US" dirty="0"/>
-              <a:t>Reason for travel: Do those who buy insurance do so for work travel or for leisurely travel?</a:t>
+              <a:t>Reason for travel: Do those who buy insurance do so for work travel or for personal travel?</a:t>
             </a:r>
             <a:br>
               <a:rPr lang="en-US" dirty="0"/>
@@ -5197,13 +5204,8 @@
           <a:p>
             <a:r>
               <a:rPr lang="en-US" dirty="0"/>
-              <a:t>Nature of work/industry: What type of work or industry do frequent flyers work in </a:t>
-            </a:r>
-            <a:r>
-              <a:rPr lang="en-US"/>
-              <a:t>the most?</a:t>
-            </a:r>
-            <a:endParaRPr lang="en-US" dirty="0"/>
+              <a:t>Nature of work/industry: What type of work or industry do frequent flyers work in the most?</a:t>
+            </a:r>
           </a:p>
         </p:txBody>
       </p:sp>

</xml_diff>